<commit_message>
upgrade to .net 9
</commit_message>
<xml_diff>
--- a/2024-11-21-VSLiveOrlando-BackgroundOnBackgroundTasks/Background-On-Background-Tasks-In-DotNet9.pptx
+++ b/2024-11-21-VSLiveOrlando-BackgroundOnBackgroundTasks/Background-On-Background-Tasks-In-DotNet9.pptx
@@ -451,7 +451,7 @@
               <a:pPr>
                 <a:defRPr/>
               </a:pPr>
-              <a:t>11/2/2024</a:t>
+              <a:t>11/10/2024</a:t>
             </a:fld>
             <a:endParaRPr lang="en-US"/>
           </a:p>
@@ -1346,7 +1346,7 @@
               <a:pPr>
                 <a:defRPr/>
               </a:pPr>
-              <a:t>11/2/2024</a:t>
+              <a:t>11/10/2024</a:t>
             </a:fld>
             <a:endParaRPr lang="en-US"/>
           </a:p>
@@ -1503,7 +1503,7 @@
               <a:pPr>
                 <a:defRPr/>
               </a:pPr>
-              <a:t>11/2/2024</a:t>
+              <a:t>11/10/2024</a:t>
             </a:fld>
             <a:endParaRPr lang="en-US"/>
           </a:p>
@@ -1670,7 +1670,7 @@
               <a:pPr>
                 <a:defRPr/>
               </a:pPr>
-              <a:t>11/2/2024</a:t>
+              <a:t>11/10/2024</a:t>
             </a:fld>
             <a:endParaRPr lang="en-US"/>
           </a:p>
@@ -1900,7 +1900,7 @@
               <a:pPr>
                 <a:defRPr/>
               </a:pPr>
-              <a:t>11/2/2024</a:t>
+              <a:t>11/10/2024</a:t>
             </a:fld>
             <a:endParaRPr lang="en-US"/>
           </a:p>
@@ -2067,7 +2067,7 @@
               <a:pPr>
                 <a:defRPr/>
               </a:pPr>
-              <a:t>11/2/2024</a:t>
+              <a:t>11/10/2024</a:t>
             </a:fld>
             <a:endParaRPr lang="en-US" dirty="0"/>
           </a:p>
@@ -2301,7 +2301,7 @@
               <a:pPr>
                 <a:defRPr/>
               </a:pPr>
-              <a:t>11/2/2024</a:t>
+              <a:t>11/10/2024</a:t>
             </a:fld>
             <a:endParaRPr lang="en-US"/>
           </a:p>
@@ -2575,7 +2575,7 @@
               <a:pPr>
                 <a:defRPr/>
               </a:pPr>
-              <a:t>11/2/2024</a:t>
+              <a:t>11/10/2024</a:t>
             </a:fld>
             <a:endParaRPr lang="en-US"/>
           </a:p>
@@ -2988,7 +2988,7 @@
               <a:pPr>
                 <a:defRPr/>
               </a:pPr>
-              <a:t>11/2/2024</a:t>
+              <a:t>11/10/2024</a:t>
             </a:fld>
             <a:endParaRPr lang="en-US"/>
           </a:p>
@@ -3094,7 +3094,7 @@
               <a:pPr>
                 <a:defRPr/>
               </a:pPr>
-              <a:t>11/2/2024</a:t>
+              <a:t>11/10/2024</a:t>
             </a:fld>
             <a:endParaRPr lang="en-US"/>
           </a:p>
@@ -3178,7 +3178,7 @@
               <a:pPr>
                 <a:defRPr/>
               </a:pPr>
-              <a:t>11/2/2024</a:t>
+              <a:t>11/10/2024</a:t>
             </a:fld>
             <a:endParaRPr lang="en-US"/>
           </a:p>
@@ -3442,7 +3442,7 @@
               <a:pPr>
                 <a:defRPr/>
               </a:pPr>
-              <a:t>11/2/2024</a:t>
+              <a:t>11/10/2024</a:t>
             </a:fld>
             <a:endParaRPr lang="en-US"/>
           </a:p>
@@ -3607,7 +3607,7 @@
               <a:pPr>
                 <a:defRPr/>
               </a:pPr>
-              <a:t>11/2/2024</a:t>
+              <a:t>11/10/2024</a:t>
             </a:fld>
             <a:endParaRPr lang="en-US" dirty="0"/>
           </a:p>
@@ -3854,7 +3854,7 @@
               <a:pPr>
                 <a:defRPr/>
               </a:pPr>
-              <a:t>11/2/2024</a:t>
+              <a:t>11/10/2024</a:t>
             </a:fld>
             <a:endParaRPr lang="en-US"/>
           </a:p>
@@ -4011,7 +4011,7 @@
               <a:pPr>
                 <a:defRPr/>
               </a:pPr>
-              <a:t>11/2/2024</a:t>
+              <a:t>11/10/2024</a:t>
             </a:fld>
             <a:endParaRPr lang="en-US"/>
           </a:p>
@@ -4178,7 +4178,7 @@
               <a:pPr>
                 <a:defRPr/>
               </a:pPr>
-              <a:t>11/2/2024</a:t>
+              <a:t>11/10/2024</a:t>
             </a:fld>
             <a:endParaRPr lang="en-US"/>
           </a:p>
@@ -4412,7 +4412,7 @@
               <a:pPr>
                 <a:defRPr/>
               </a:pPr>
-              <a:t>11/2/2024</a:t>
+              <a:t>11/10/2024</a:t>
             </a:fld>
             <a:endParaRPr lang="en-US"/>
           </a:p>
@@ -4686,7 +4686,7 @@
               <a:pPr>
                 <a:defRPr/>
               </a:pPr>
-              <a:t>11/2/2024</a:t>
+              <a:t>11/10/2024</a:t>
             </a:fld>
             <a:endParaRPr lang="en-US"/>
           </a:p>
@@ -5099,7 +5099,7 @@
               <a:pPr>
                 <a:defRPr/>
               </a:pPr>
-              <a:t>11/2/2024</a:t>
+              <a:t>11/10/2024</a:t>
             </a:fld>
             <a:endParaRPr lang="en-US"/>
           </a:p>
@@ -5205,7 +5205,7 @@
               <a:pPr>
                 <a:defRPr/>
               </a:pPr>
-              <a:t>11/2/2024</a:t>
+              <a:t>11/10/2024</a:t>
             </a:fld>
             <a:endParaRPr lang="en-US"/>
           </a:p>
@@ -5289,7 +5289,7 @@
               <a:pPr>
                 <a:defRPr/>
               </a:pPr>
-              <a:t>11/2/2024</a:t>
+              <a:t>11/10/2024</a:t>
             </a:fld>
             <a:endParaRPr lang="en-US"/>
           </a:p>
@@ -5553,7 +5553,7 @@
               <a:pPr>
                 <a:defRPr/>
               </a:pPr>
-              <a:t>11/2/2024</a:t>
+              <a:t>11/10/2024</a:t>
             </a:fld>
             <a:endParaRPr lang="en-US"/>
           </a:p>
@@ -5797,7 +5797,7 @@
               <a:pPr>
                 <a:defRPr/>
               </a:pPr>
-              <a:t>11/2/2024</a:t>
+              <a:t>11/10/2024</a:t>
             </a:fld>
             <a:endParaRPr lang="en-US"/>
           </a:p>
@@ -6030,7 +6030,7 @@
               <a:pPr>
                 <a:defRPr/>
               </a:pPr>
-              <a:t>11/2/2024</a:t>
+              <a:t>11/10/2024</a:t>
             </a:fld>
             <a:endParaRPr lang="en-US"/>
           </a:p>
@@ -6709,7 +6709,7 @@
               <a:pPr>
                 <a:defRPr/>
               </a:pPr>
-              <a:t>11/2/2024</a:t>
+              <a:t>11/10/2024</a:t>
             </a:fld>
             <a:endParaRPr lang="en-US"/>
           </a:p>
@@ -20571,9 +20571,18 @@
           </a:p>
           <a:p>
             <a:r>
+              <a:rPr lang="en-US" sz="2600"/>
+              <a:t>https://github.com/scottsauber/talks</a:t>
+            </a:r>
+          </a:p>
+          <a:p>
+            <a:r>
               <a:rPr lang="en-US" sz="2600" dirty="0"/>
               <a:t>This slide deck</a:t>
             </a:r>
+          </a:p>
+          <a:p>
+            <a:endParaRPr lang="en-US" sz="2600" dirty="0"/>
           </a:p>
         </p:txBody>
       </p:sp>
@@ -20818,6 +20827,87 @@
                                           <p:spTgt spid="3">
                                             <p:txEl>
                                               <p:pRg st="2" end="2"/>
+                                            </p:txEl>
+                                          </p:spTgt>
+                                        </p:tgtEl>
+                                        <p:attrNameLst>
+                                          <p:attrName>ppt_c</p:attrName>
+                                        </p:attrNameLst>
+                                      </p:cBhvr>
+                                      <p:to>
+                                        <a:srgbClr val="B2B2B2"/>
+                                      </p:to>
+                                    </p:animClr>
+                                  </p:subTnLst>
+                                </p:cTn>
+                              </p:par>
+                            </p:childTnLst>
+                          </p:cTn>
+                        </p:par>
+                      </p:childTnLst>
+                    </p:cTn>
+                  </p:par>
+                  <p:par>
+                    <p:cTn id="18" fill="hold">
+                      <p:stCondLst>
+                        <p:cond delay="indefinite"/>
+                      </p:stCondLst>
+                      <p:childTnLst>
+                        <p:par>
+                          <p:cTn id="19" fill="hold">
+                            <p:stCondLst>
+                              <p:cond delay="0"/>
+                            </p:stCondLst>
+                            <p:childTnLst>
+                              <p:par>
+                                <p:cTn id="20" presetID="10" presetClass="entr" presetSubtype="0" fill="hold" grpId="0" nodeType="clickEffect">
+                                  <p:stCondLst>
+                                    <p:cond delay="0"/>
+                                  </p:stCondLst>
+                                  <p:childTnLst>
+                                    <p:set>
+                                      <p:cBhvr>
+                                        <p:cTn id="21" dur="1" fill="hold">
+                                          <p:stCondLst>
+                                            <p:cond delay="0"/>
+                                          </p:stCondLst>
+                                        </p:cTn>
+                                        <p:tgtEl>
+                                          <p:spTgt spid="3">
+                                            <p:txEl>
+                                              <p:pRg st="3" end="3"/>
+                                            </p:txEl>
+                                          </p:spTgt>
+                                        </p:tgtEl>
+                                        <p:attrNameLst>
+                                          <p:attrName>style.visibility</p:attrName>
+                                        </p:attrNameLst>
+                                      </p:cBhvr>
+                                      <p:to>
+                                        <p:strVal val="visible"/>
+                                      </p:to>
+                                    </p:set>
+                                    <p:animEffect transition="in" filter="fade">
+                                      <p:cBhvr>
+                                        <p:cTn id="22" dur="500"/>
+                                        <p:tgtEl>
+                                          <p:spTgt spid="3">
+                                            <p:txEl>
+                                              <p:pRg st="3" end="3"/>
+                                            </p:txEl>
+                                          </p:spTgt>
+                                        </p:tgtEl>
+                                      </p:cBhvr>
+                                    </p:animEffect>
+                                  </p:childTnLst>
+                                  <p:subTnLst>
+                                    <p:animClr clrSpc="rgb" dir="cw">
+                                      <p:cBhvr override="childStyle">
+                                        <p:cTn dur="1" fill="hold" display="0" masterRel="nextClick" afterEffect="1"/>
+                                        <p:tgtEl>
+                                          <p:spTgt spid="3">
+                                            <p:txEl>
+                                              <p:pRg st="3" end="3"/>
                                             </p:txEl>
                                           </p:spTgt>
                                         </p:tgtEl>

</xml_diff>